<commit_message>
correct mislabeling / replace graph for clarity
</commit_message>
<xml_diff>
--- a/Outputs/Presentations/20221130 Schurgin, Wixted & Brady (2020) LSR JC/20221130 Schurgin, Wixted & Brady (2020) LSR JC.pptx
+++ b/Outputs/Presentations/20221130 Schurgin, Wixted & Brady (2020) LSR JC/20221130 Schurgin, Wixted & Brady (2020) LSR JC.pptx
@@ -13671,18 +13671,17 @@
           <p:cNvPicPr preferRelativeResize="0"/>
           <p:nvPr/>
         </p:nvPicPr>
-        <p:blipFill>
+        <p:blipFill rotWithShape="1">
           <a:blip r:embed="rId3">
             <a:alphaModFix/>
           </a:blip>
-          <a:stretch>
-            <a:fillRect/>
-          </a:stretch>
+          <a:srcRect b="0" l="0" r="0" t="0"/>
+          <a:stretch/>
         </p:blipFill>
         <p:spPr>
           <a:xfrm>
             <a:off x="4375450" y="983300"/>
-            <a:ext cx="4983224" cy="3737425"/>
+            <a:ext cx="4983223" cy="3737425"/>
           </a:xfrm>
           <a:prstGeom prst="rect">
             <a:avLst/>
@@ -13874,7 +13873,7 @@
             </a:pPr>
             <a:r>
               <a:rPr lang="en-GB"/>
-              <a:t>d’ = 0.1</a:t>
+              <a:t>d’ = 1</a:t>
             </a:r>
             <a:endParaRPr/>
           </a:p>
@@ -13911,18 +13910,17 @@
           <p:cNvPicPr preferRelativeResize="0"/>
           <p:nvPr/>
         </p:nvPicPr>
-        <p:blipFill>
+        <p:blipFill rotWithShape="1">
           <a:blip r:embed="rId3">
             <a:alphaModFix/>
           </a:blip>
-          <a:stretch>
-            <a:fillRect/>
-          </a:stretch>
+          <a:srcRect b="0" l="0" r="0" t="0"/>
+          <a:stretch/>
         </p:blipFill>
         <p:spPr>
           <a:xfrm>
             <a:off x="4375450" y="983301"/>
-            <a:ext cx="4983224" cy="3737412"/>
+            <a:ext cx="4983223" cy="3737412"/>
           </a:xfrm>
           <a:prstGeom prst="rect">
             <a:avLst/>
@@ -14169,7 +14167,7 @@
             </a:pPr>
             <a:r>
               <a:rPr lang="en-GB"/>
-              <a:t>d’ = 0.2</a:t>
+              <a:t>d’ = 3</a:t>
             </a:r>
             <a:endParaRPr/>
           </a:p>

</xml_diff>